<commit_message>
update route, js, ejs
</commit_message>
<xml_diff>
--- a/public/file/Assignment.pptx
+++ b/public/file/Assignment.pptx
@@ -104,6 +104,11 @@
       </a:defRPr>
     </a:lvl9pPr>
   </p:defaultTextStyle>
+  <p:extLst>
+    <p:ext uri="{EFAFB233-063F-42B5-8137-9DF3F51BA10A}">
+      <p15:sldGuideLst xmlns:p15="http://schemas.microsoft.com/office/powerpoint/2012/main"/>
+    </p:ext>
+  </p:extLst>
 </p:presentation>
 </file>
 
@@ -333,7 +338,7 @@
           <a:p>
             <a:fld id="{A13F7D9B-B01B-4B9A-A044-AC013AD20780}" type="datetimeFigureOut">
               <a:rPr lang="zh-HK" altLang="en-US" smtClean="0"/>
-              <a:t>17/9/2022</a:t>
+              <a:t>16/10/2022</a:t>
             </a:fld>
             <a:endParaRPr lang="zh-HK" altLang="en-US"/>
           </a:p>
@@ -541,7 +546,7 @@
           <a:p>
             <a:fld id="{A13F7D9B-B01B-4B9A-A044-AC013AD20780}" type="datetimeFigureOut">
               <a:rPr lang="zh-HK" altLang="en-US" smtClean="0"/>
-              <a:t>17/9/2022</a:t>
+              <a:t>16/10/2022</a:t>
             </a:fld>
             <a:endParaRPr lang="zh-HK" altLang="en-US"/>
           </a:p>
@@ -797,7 +802,7 @@
           <a:p>
             <a:fld id="{A13F7D9B-B01B-4B9A-A044-AC013AD20780}" type="datetimeFigureOut">
               <a:rPr lang="zh-HK" altLang="en-US" smtClean="0"/>
-              <a:t>17/9/2022</a:t>
+              <a:t>16/10/2022</a:t>
             </a:fld>
             <a:endParaRPr lang="zh-HK" altLang="en-US"/>
           </a:p>
@@ -971,7 +976,7 @@
           <a:p>
             <a:fld id="{A13F7D9B-B01B-4B9A-A044-AC013AD20780}" type="datetimeFigureOut">
               <a:rPr lang="zh-HK" altLang="en-US" smtClean="0"/>
-              <a:t>17/9/2022</a:t>
+              <a:t>16/10/2022</a:t>
             </a:fld>
             <a:endParaRPr lang="zh-HK" altLang="en-US"/>
           </a:p>
@@ -1314,7 +1319,7 @@
           <a:p>
             <a:fld id="{A13F7D9B-B01B-4B9A-A044-AC013AD20780}" type="datetimeFigureOut">
               <a:rPr lang="zh-HK" altLang="en-US" smtClean="0"/>
-              <a:t>17/9/2022</a:t>
+              <a:t>16/10/2022</a:t>
             </a:fld>
             <a:endParaRPr lang="zh-HK" altLang="en-US"/>
           </a:p>
@@ -1589,7 +1594,7 @@
           <a:p>
             <a:fld id="{A13F7D9B-B01B-4B9A-A044-AC013AD20780}" type="datetimeFigureOut">
               <a:rPr lang="zh-HK" altLang="en-US" smtClean="0"/>
-              <a:t>17/9/2022</a:t>
+              <a:t>16/10/2022</a:t>
             </a:fld>
             <a:endParaRPr lang="zh-HK" altLang="en-US"/>
           </a:p>
@@ -1968,7 +1973,7 @@
           <a:p>
             <a:fld id="{A13F7D9B-B01B-4B9A-A044-AC013AD20780}" type="datetimeFigureOut">
               <a:rPr lang="zh-HK" altLang="en-US" smtClean="0"/>
-              <a:t>17/9/2022</a:t>
+              <a:t>16/10/2022</a:t>
             </a:fld>
             <a:endParaRPr lang="zh-HK" altLang="en-US"/>
           </a:p>
@@ -2086,7 +2091,7 @@
           <a:p>
             <a:fld id="{A13F7D9B-B01B-4B9A-A044-AC013AD20780}" type="datetimeFigureOut">
               <a:rPr lang="zh-HK" altLang="en-US" smtClean="0"/>
-              <a:t>17/9/2022</a:t>
+              <a:t>16/10/2022</a:t>
             </a:fld>
             <a:endParaRPr lang="zh-HK" altLang="en-US"/>
           </a:p>
@@ -2257,7 +2262,7 @@
           <a:p>
             <a:fld id="{A13F7D9B-B01B-4B9A-A044-AC013AD20780}" type="datetimeFigureOut">
               <a:rPr lang="zh-HK" altLang="en-US" smtClean="0"/>
-              <a:t>17/9/2022</a:t>
+              <a:t>16/10/2022</a:t>
             </a:fld>
             <a:endParaRPr lang="zh-HK" altLang="en-US"/>
           </a:p>
@@ -2611,7 +2616,7 @@
           <a:p>
             <a:fld id="{A13F7D9B-B01B-4B9A-A044-AC013AD20780}" type="datetimeFigureOut">
               <a:rPr lang="zh-HK" altLang="en-US" smtClean="0"/>
-              <a:t>17/9/2022</a:t>
+              <a:t>16/10/2022</a:t>
             </a:fld>
             <a:endParaRPr lang="zh-HK" altLang="en-US"/>
           </a:p>
@@ -2993,7 +2998,7 @@
           <a:p>
             <a:fld id="{A13F7D9B-B01B-4B9A-A044-AC013AD20780}" type="datetimeFigureOut">
               <a:rPr lang="zh-HK" altLang="en-US" smtClean="0"/>
-              <a:t>17/9/2022</a:t>
+              <a:t>16/10/2022</a:t>
             </a:fld>
             <a:endParaRPr lang="zh-HK" altLang="en-US"/>
           </a:p>
@@ -3280,7 +3285,7 @@
           <a:p>
             <a:fld id="{A13F7D9B-B01B-4B9A-A044-AC013AD20780}" type="datetimeFigureOut">
               <a:rPr lang="zh-HK" altLang="en-US" smtClean="0"/>
-              <a:t>17/9/2022</a:t>
+              <a:t>16/10/2022</a:t>
             </a:fld>
             <a:endParaRPr lang="zh-HK" altLang="en-US"/>
           </a:p>
@@ -3956,13 +3961,39 @@
           <a:lstStyle/>
           <a:p>
             <a:r>
+              <a:rPr lang="en-US" altLang="zh-HK" sz="3600" kern="1200" spc="-50" baseline="0">
+                <a:solidFill>
+                  <a:srgbClr val="FFFFFF"/>
+                </a:solidFill>
+                <a:latin typeface="Abadi" panose="020B0604020104020204" pitchFamily="34" charset="0"/>
+              </a:rPr>
+              <a:t>Assignment </a:t>
+            </a:r>
+            <a:r>
               <a:rPr lang="en-US" altLang="zh-HK" sz="3600" kern="1200" spc="-50" baseline="0" dirty="0">
                 <a:solidFill>
                   <a:srgbClr val="FFFFFF"/>
                 </a:solidFill>
                 <a:latin typeface="Abadi" panose="020B0604020104020204" pitchFamily="34" charset="0"/>
               </a:rPr>
-              <a:t>Assignment: Assignment 1 Express Portfolio Site</a:t>
+              <a:t>2</a:t>
+            </a:r>
+            <a:br>
+              <a:rPr lang="en-US" altLang="zh-HK" sz="3600" kern="1200" spc="-50" baseline="0" dirty="0">
+                <a:solidFill>
+                  <a:srgbClr val="FFFFFF"/>
+                </a:solidFill>
+                <a:latin typeface="Abadi" panose="020B0604020104020204" pitchFamily="34" charset="0"/>
+              </a:rPr>
+            </a:br>
+            <a:r>
+              <a:rPr lang="en-US" altLang="zh-HK" sz="3600" kern="1200" spc="-50" baseline="0" dirty="0">
+                <a:solidFill>
+                  <a:srgbClr val="FFFFFF"/>
+                </a:solidFill>
+                <a:latin typeface="Abadi" panose="020B0604020104020204" pitchFamily="34" charset="0"/>
+              </a:rPr>
+              <a:t>Express Portfolio – Authentication</a:t>
             </a:r>
           </a:p>
         </p:txBody>

</xml_diff>